<commit_message>
litle modification to the ppt file
</commit_message>
<xml_diff>
--- a/LibraryFrameworkPresentation.pptx
+++ b/LibraryFrameworkPresentation.pptx
@@ -1526,7 +1526,7 @@
           <a:p>
             <a:fld id="{3B3028A5-A737-8F44-80AA-54631241E139}" type="datetimeFigureOut">
               <a:rPr lang="en-US" smtClean="0"/>
-              <a:t>8/5/2019</a:t>
+              <a:t>8/9/2019</a:t>
             </a:fld>
             <a:endParaRPr lang="en-US"/>
           </a:p>
@@ -2985,7 +2985,7 @@
           <a:p>
             <a:fld id="{3B3028A5-A737-8F44-80AA-54631241E139}" type="datetimeFigureOut">
               <a:rPr lang="en-US" smtClean="0"/>
-              <a:t>8/5/2019</a:t>
+              <a:t>8/9/2019</a:t>
             </a:fld>
             <a:endParaRPr lang="en-US"/>
           </a:p>
@@ -4438,7 +4438,7 @@
           <a:p>
             <a:fld id="{3B3028A5-A737-8F44-80AA-54631241E139}" type="datetimeFigureOut">
               <a:rPr lang="en-US" smtClean="0"/>
-              <a:t>8/5/2019</a:t>
+              <a:t>8/9/2019</a:t>
             </a:fld>
             <a:endParaRPr lang="en-US"/>
           </a:p>
@@ -5893,7 +5893,7 @@
           <a:p>
             <a:fld id="{3B3028A5-A737-8F44-80AA-54631241E139}" type="datetimeFigureOut">
               <a:rPr lang="en-US" smtClean="0"/>
-              <a:t>8/5/2019</a:t>
+              <a:t>8/9/2019</a:t>
             </a:fld>
             <a:endParaRPr lang="en-US"/>
           </a:p>
@@ -7401,7 +7401,7 @@
           <a:p>
             <a:fld id="{3B3028A5-A737-8F44-80AA-54631241E139}" type="datetimeFigureOut">
               <a:rPr lang="en-US" smtClean="0"/>
-              <a:t>8/5/2019</a:t>
+              <a:t>8/9/2019</a:t>
             </a:fld>
             <a:endParaRPr lang="en-US"/>
           </a:p>
@@ -8922,7 +8922,7 @@
           <a:p>
             <a:fld id="{3B3028A5-A737-8F44-80AA-54631241E139}" type="datetimeFigureOut">
               <a:rPr lang="en-US" smtClean="0"/>
-              <a:t>8/5/2019</a:t>
+              <a:t>8/9/2019</a:t>
             </a:fld>
             <a:endParaRPr lang="en-US"/>
           </a:p>
@@ -10587,7 +10587,7 @@
           <a:p>
             <a:fld id="{3B3028A5-A737-8F44-80AA-54631241E139}" type="datetimeFigureOut">
               <a:rPr lang="en-US" smtClean="0"/>
-              <a:t>8/5/2019</a:t>
+              <a:t>8/9/2019</a:t>
             </a:fld>
             <a:endParaRPr lang="en-US"/>
           </a:p>
@@ -11985,7 +11985,7 @@
           <a:p>
             <a:fld id="{3B3028A5-A737-8F44-80AA-54631241E139}" type="datetimeFigureOut">
               <a:rPr lang="en-US" smtClean="0"/>
-              <a:t>8/5/2019</a:t>
+              <a:t>8/9/2019</a:t>
             </a:fld>
             <a:endParaRPr lang="en-US"/>
           </a:p>
@@ -12085,7 +12085,7 @@
           <a:p>
             <a:fld id="{3B3028A5-A737-8F44-80AA-54631241E139}" type="datetimeFigureOut">
               <a:rPr lang="en-US" smtClean="0"/>
-              <a:t>8/5/2019</a:t>
+              <a:t>8/9/2019</a:t>
             </a:fld>
             <a:endParaRPr lang="en-US"/>
           </a:p>
@@ -13611,7 +13611,7 @@
           <a:p>
             <a:fld id="{3B3028A5-A737-8F44-80AA-54631241E139}" type="datetimeFigureOut">
               <a:rPr lang="en-US" smtClean="0"/>
-              <a:t>8/5/2019</a:t>
+              <a:t>8/9/2019</a:t>
             </a:fld>
             <a:endParaRPr lang="en-US"/>
           </a:p>
@@ -15147,7 +15147,7 @@
           <a:p>
             <a:fld id="{3B3028A5-A737-8F44-80AA-54631241E139}" type="datetimeFigureOut">
               <a:rPr lang="en-US" smtClean="0"/>
-              <a:t>8/5/2019</a:t>
+              <a:t>8/9/2019</a:t>
             </a:fld>
             <a:endParaRPr lang="en-US"/>
           </a:p>
@@ -15370,7 +15370,7 @@
           <a:p>
             <a:fld id="{3B3028A5-A737-8F44-80AA-54631241E139}" type="datetimeFigureOut">
               <a:rPr lang="en-US" smtClean="0"/>
-              <a:t>8/5/2019</a:t>
+              <a:t>8/9/2019</a:t>
             </a:fld>
             <a:endParaRPr lang="en-US"/>
           </a:p>
@@ -15846,7 +15846,7 @@
           <a:p>
             <a:r>
               <a:rPr lang="en-US" dirty="0"/>
-              <a:t>Library Management System</a:t>
+              <a:t>Library Management Framework</a:t>
             </a:r>
           </a:p>
         </p:txBody>
@@ -15873,8 +15873,12 @@
           <a:lstStyle/>
           <a:p>
             <a:r>
+              <a:rPr lang="en-US"/>
+              <a:t>By </a:t>
+            </a:r>
+            <a:r>
               <a:rPr lang="en-US" dirty="0"/>
-              <a:t>Work by Group 6</a:t>
+              <a:t>Group 1</a:t>
             </a:r>
           </a:p>
         </p:txBody>
@@ -15975,12 +15979,8 @@
           </a:p>
           <a:p>
             <a:r>
-              <a:rPr lang="en-US" dirty="0" err="1"/>
-              <a:t>Musiliu</a:t>
-            </a:r>
-            <a:r>
               <a:rPr lang="en-US" dirty="0"/>
-              <a:t> Adeniyi Bolaji (</a:t>
+              <a:t>Musiliu Adeniyi Bolaji (</a:t>
             </a:r>
             <a:r>
               <a:rPr lang="en-US" dirty="0">
@@ -15996,15 +15996,7 @@
           <a:p>
             <a:r>
               <a:rPr lang="en-US" dirty="0"/>
-              <a:t>Aaron </a:t>
-            </a:r>
-            <a:r>
-              <a:rPr lang="en-US" dirty="0" err="1"/>
-              <a:t>Gezai</a:t>
-            </a:r>
-            <a:r>
-              <a:rPr lang="en-US" dirty="0"/>
-              <a:t> (</a:t>
+              <a:t>Aaron Gezai (</a:t>
             </a:r>
             <a:r>
               <a:rPr lang="en-US" dirty="0">
@@ -16549,12 +16541,8 @@
           <a:p>
             <a:pPr algn="ctr"/>
             <a:r>
-              <a:rPr lang="en-US" dirty="0" err="1"/>
-              <a:t>Framwork</a:t>
-            </a:r>
-            <a:r>
               <a:rPr lang="en-US" dirty="0"/>
-              <a:t> design</a:t>
+              <a:t>Framework design</a:t>
             </a:r>
           </a:p>
         </p:txBody>
@@ -16624,61 +16612,6 @@
       </p:sp>
       <p:sp>
         <p:nvSpPr>
-          <p:cNvPr id="4" name="Title 1">
-            <a:extLst>
-              <a:ext uri="{FF2B5EF4-FFF2-40B4-BE49-F238E27FC236}">
-                <a16:creationId xmlns:a16="http://schemas.microsoft.com/office/drawing/2014/main" id="{A75AC7E9-12E9-4891-B783-7133637B9F4B}"/>
-              </a:ext>
-            </a:extLst>
-          </p:cNvPr>
-          <p:cNvSpPr txBox="1">
-            <a:spLocks/>
-          </p:cNvSpPr>
-          <p:nvPr/>
-        </p:nvSpPr>
-        <p:spPr>
-          <a:xfrm>
-            <a:off x="823303" y="1652592"/>
-            <a:ext cx="3601060" cy="609600"/>
-          </a:xfrm>
-          <a:prstGeom prst="rect">
-            <a:avLst/>
-          </a:prstGeom>
-        </p:spPr>
-        <p:txBody>
-          <a:bodyPr vert="horz" lIns="228600" tIns="228600" rIns="228600" bIns="228600" rtlCol="0" anchor="ctr">
-            <a:noAutofit/>
-          </a:bodyPr>
-          <a:lstStyle>
-            <a:lvl1pPr algn="ctr" defTabSz="914400" rtl="0" eaLnBrk="1" latinLnBrk="0" hangingPunct="1">
-              <a:lnSpc>
-                <a:spcPct val="85000"/>
-              </a:lnSpc>
-              <a:spcBef>
-                <a:spcPct val="0"/>
-              </a:spcBef>
-              <a:buNone/>
-              <a:defRPr sz="4000" b="0" i="0" kern="1200" cap="none" spc="-150">
-                <a:solidFill>
-                  <a:srgbClr val="FFFEFF"/>
-                </a:solidFill>
-                <a:effectLst/>
-                <a:latin typeface="+mj-lt"/>
-                <a:ea typeface="+mj-ea"/>
-                <a:cs typeface="+mj-cs"/>
-              </a:defRPr>
-            </a:lvl1pPr>
-          </a:lstStyle>
-          <a:p>
-            <a:r>
-              <a:rPr lang="en-US" sz="2400" dirty="0"/>
-              <a:t>Title</a:t>
-            </a:r>
-          </a:p>
-        </p:txBody>
-      </p:sp>
-      <p:sp>
-        <p:nvSpPr>
           <p:cNvPr id="5" name="Content Placeholder 4">
             <a:extLst>
               <a:ext uri="{FF2B5EF4-FFF2-40B4-BE49-F238E27FC236}">
@@ -16707,7 +16640,69 @@
           <a:p>
             <a:r>
               <a:rPr lang="en-US" dirty="0"/>
-              <a:t>Whatever need to be explain here</a:t>
+              <a:t>The framework is developed to make Library Application development easy for application developers across different platforms.</a:t>
+            </a:r>
+          </a:p>
+          <a:p>
+            <a:r>
+              <a:rPr lang="en-US" dirty="0"/>
+              <a:t>The framework exposes four major APIs/services:</a:t>
+            </a:r>
+          </a:p>
+          <a:p>
+            <a:pPr lvl="1"/>
+            <a:r>
+              <a:rPr lang="en-US" dirty="0" err="1"/>
+              <a:t>UserService</a:t>
+            </a:r>
+            <a:r>
+              <a:rPr lang="en-US" dirty="0"/>
+              <a:t> – to manager users</a:t>
+            </a:r>
+          </a:p>
+          <a:p>
+            <a:pPr lvl="1"/>
+            <a:r>
+              <a:rPr lang="en-US" dirty="0" err="1"/>
+              <a:t>BookService</a:t>
+            </a:r>
+            <a:r>
+              <a:rPr lang="en-US" dirty="0"/>
+              <a:t> – to manage books</a:t>
+            </a:r>
+          </a:p>
+          <a:p>
+            <a:pPr lvl="1"/>
+            <a:r>
+              <a:rPr lang="en-US" dirty="0" err="1"/>
+              <a:t>AuthorService</a:t>
+            </a:r>
+            <a:r>
+              <a:rPr lang="en-US" dirty="0"/>
+              <a:t> – to manage authors</a:t>
+            </a:r>
+          </a:p>
+          <a:p>
+            <a:pPr lvl="1"/>
+            <a:r>
+              <a:rPr lang="en-US" dirty="0" err="1"/>
+              <a:t>CheckOutService</a:t>
+            </a:r>
+            <a:r>
+              <a:rPr lang="en-US" dirty="0"/>
+              <a:t> – to manage book checkouts</a:t>
+            </a:r>
+          </a:p>
+          <a:p>
+            <a:r>
+              <a:rPr lang="en-US" dirty="0"/>
+              <a:t>The developer can specify which and where to save records : Flat File or Relational Database</a:t>
+            </a:r>
+          </a:p>
+          <a:p>
+            <a:r>
+              <a:rPr lang="en-US" dirty="0"/>
+              <a:t>The framework makes use of design patterns : Command, Factory Method, Singleton, Façade, Adapter, Strategy and Template patterns</a:t>
             </a:r>
           </a:p>
           <a:p>

</xml_diff>